<commit_message>
merch login color changed
</commit_message>
<xml_diff>
--- a/design ex..pptx
+++ b/design ex..pptx
@@ -4617,8 +4617,198 @@
         </p:nvSpPr>
         <p:spPr>
           <a:xfrm>
-            <a:off x="560439" y="727587"/>
-            <a:ext cx="2782529" cy="1691148"/>
+            <a:off x="196646" y="2386781"/>
+            <a:ext cx="3264309" cy="1956619"/>
+          </a:xfrm>
+          <a:prstGeom prst="roundRect">
+            <a:avLst/>
+          </a:prstGeom>
+          <a:solidFill>
+            <a:schemeClr val="bg1">
+              <a:lumMod val="95000"/>
+            </a:schemeClr>
+          </a:solidFill>
+          <a:ln>
+            <a:solidFill>
+              <a:schemeClr val="bg1">
+                <a:lumMod val="85000"/>
+              </a:schemeClr>
+            </a:solidFill>
+          </a:ln>
+        </p:spPr>
+        <p:style>
+          <a:lnRef idx="2">
+            <a:schemeClr val="accent1">
+              <a:shade val="15000"/>
+            </a:schemeClr>
+          </a:lnRef>
+          <a:fillRef idx="1">
+            <a:schemeClr val="accent1"/>
+          </a:fillRef>
+          <a:effectRef idx="0">
+            <a:schemeClr val="accent1"/>
+          </a:effectRef>
+          <a:fontRef idx="minor">
+            <a:schemeClr val="lt1"/>
+          </a:fontRef>
+        </p:style>
+        <p:txBody>
+          <a:bodyPr rtlCol="0" anchor="ctr"/>
+          <a:lstStyle/>
+          <a:p>
+            <a:pPr algn="ctr"/>
+            <a:endParaRPr lang="en-IN" dirty="0">
+              <a:solidFill>
+                <a:schemeClr val="tx1"/>
+              </a:solidFill>
+            </a:endParaRPr>
+          </a:p>
+        </p:txBody>
+      </p:sp>
+      <p:sp>
+        <p:nvSpPr>
+          <p:cNvPr id="5" name="Rectangle: Rounded Corners 4">
+            <a:extLst>
+              <a:ext uri="{FF2B5EF4-FFF2-40B4-BE49-F238E27FC236}">
+                <a16:creationId xmlns:a16="http://schemas.microsoft.com/office/drawing/2014/main" id="{CF38B576-DDCC-122C-0179-5572A35FAD99}"/>
+              </a:ext>
+            </a:extLst>
+          </p:cNvPr>
+          <p:cNvSpPr/>
+          <p:nvPr/>
+        </p:nvSpPr>
+        <p:spPr>
+          <a:xfrm>
+            <a:off x="530941" y="3429000"/>
+            <a:ext cx="1253614" cy="349044"/>
+          </a:xfrm>
+          <a:prstGeom prst="roundRect">
+            <a:avLst/>
+          </a:prstGeom>
+          <a:solidFill>
+            <a:srgbClr val="00D7B9"/>
+          </a:solidFill>
+          <a:ln>
+            <a:solidFill>
+              <a:srgbClr val="00D7B9"/>
+            </a:solidFill>
+          </a:ln>
+        </p:spPr>
+        <p:style>
+          <a:lnRef idx="2">
+            <a:schemeClr val="accent1">
+              <a:shade val="15000"/>
+            </a:schemeClr>
+          </a:lnRef>
+          <a:fillRef idx="1">
+            <a:schemeClr val="accent1"/>
+          </a:fillRef>
+          <a:effectRef idx="0">
+            <a:schemeClr val="accent1"/>
+          </a:effectRef>
+          <a:fontRef idx="minor">
+            <a:schemeClr val="lt1"/>
+          </a:fontRef>
+        </p:style>
+        <p:txBody>
+          <a:bodyPr rtlCol="0" anchor="ctr"/>
+          <a:lstStyle/>
+          <a:p>
+            <a:pPr algn="ctr"/>
+            <a:r>
+              <a:rPr lang="en-IN" dirty="0">
+                <a:solidFill>
+                  <a:schemeClr val="bg1"/>
+                </a:solidFill>
+                <a:latin typeface="Calibri" panose="020F0502020204030204" pitchFamily="34" charset="0"/>
+                <a:ea typeface="Calibri" panose="020F0502020204030204" pitchFamily="34" charset="0"/>
+                <a:cs typeface="Calibri" panose="020F0502020204030204" pitchFamily="34" charset="0"/>
+              </a:rPr>
+              <a:t>New Entry</a:t>
+            </a:r>
+          </a:p>
+        </p:txBody>
+      </p:sp>
+      <p:sp>
+        <p:nvSpPr>
+          <p:cNvPr id="6" name="Rectangle: Rounded Corners 5">
+            <a:extLst>
+              <a:ext uri="{FF2B5EF4-FFF2-40B4-BE49-F238E27FC236}">
+                <a16:creationId xmlns:a16="http://schemas.microsoft.com/office/drawing/2014/main" id="{58891052-F960-9EA8-9711-C8813EFE3D03}"/>
+              </a:ext>
+            </a:extLst>
+          </p:cNvPr>
+          <p:cNvSpPr/>
+          <p:nvPr/>
+        </p:nvSpPr>
+        <p:spPr>
+          <a:xfrm>
+            <a:off x="1922205" y="3429000"/>
+            <a:ext cx="1253614" cy="349044"/>
+          </a:xfrm>
+          <a:prstGeom prst="roundRect">
+            <a:avLst/>
+          </a:prstGeom>
+          <a:solidFill>
+            <a:srgbClr val="00D7B9"/>
+          </a:solidFill>
+          <a:ln>
+            <a:solidFill>
+              <a:srgbClr val="00D7B9"/>
+            </a:solidFill>
+          </a:ln>
+        </p:spPr>
+        <p:style>
+          <a:lnRef idx="2">
+            <a:schemeClr val="accent1">
+              <a:shade val="15000"/>
+            </a:schemeClr>
+          </a:lnRef>
+          <a:fillRef idx="1">
+            <a:schemeClr val="accent1"/>
+          </a:fillRef>
+          <a:effectRef idx="0">
+            <a:schemeClr val="accent1"/>
+          </a:effectRef>
+          <a:fontRef idx="minor">
+            <a:schemeClr val="lt1"/>
+          </a:fontRef>
+        </p:style>
+        <p:txBody>
+          <a:bodyPr rtlCol="0" anchor="ctr"/>
+          <a:lstStyle/>
+          <a:p>
+            <a:pPr algn="ctr"/>
+            <a:r>
+              <a:rPr lang="en-IN" dirty="0">
+                <a:solidFill>
+                  <a:schemeClr val="bg1"/>
+                </a:solidFill>
+                <a:latin typeface="Calibri" panose="020F0502020204030204" pitchFamily="34" charset="0"/>
+                <a:ea typeface="Calibri" panose="020F0502020204030204" pitchFamily="34" charset="0"/>
+                <a:cs typeface="Calibri" panose="020F0502020204030204" pitchFamily="34" charset="0"/>
+              </a:rPr>
+              <a:t>Details</a:t>
+            </a:r>
+          </a:p>
+        </p:txBody>
+      </p:sp>
+      <p:sp>
+        <p:nvSpPr>
+          <p:cNvPr id="7" name="Rectangle: Rounded Corners 6">
+            <a:extLst>
+              <a:ext uri="{FF2B5EF4-FFF2-40B4-BE49-F238E27FC236}">
+                <a16:creationId xmlns:a16="http://schemas.microsoft.com/office/drawing/2014/main" id="{300076D1-D196-A8D7-3593-AA4DBAA5748A}"/>
+              </a:ext>
+            </a:extLst>
+          </p:cNvPr>
+          <p:cNvSpPr/>
+          <p:nvPr/>
+        </p:nvSpPr>
+        <p:spPr>
+          <a:xfrm>
+            <a:off x="1157748" y="2819400"/>
+            <a:ext cx="1253614" cy="349044"/>
           </a:xfrm>
           <a:prstGeom prst="roundRect">
             <a:avLst/>
@@ -4653,118 +4843,783 @@
           <a:lstStyle/>
           <a:p>
             <a:pPr algn="ctr"/>
-            <a:endParaRPr lang="en-IN"/>
-          </a:p>
-        </p:txBody>
-      </p:sp>
-      <p:sp>
-        <p:nvSpPr>
-          <p:cNvPr id="3" name="Rectangle: Rounded Corners 2">
-            <a:extLst>
-              <a:ext uri="{FF2B5EF4-FFF2-40B4-BE49-F238E27FC236}">
-                <a16:creationId xmlns:a16="http://schemas.microsoft.com/office/drawing/2014/main" id="{64C088E1-7DED-6391-4EDA-D16591417419}"/>
-              </a:ext>
-            </a:extLst>
-          </p:cNvPr>
-          <p:cNvSpPr/>
+            <a:r>
+              <a:rPr lang="en-IN" dirty="0">
+                <a:solidFill>
+                  <a:schemeClr val="tx1"/>
+                </a:solidFill>
+                <a:latin typeface="Calibri" panose="020F0502020204030204" pitchFamily="34" charset="0"/>
+                <a:ea typeface="Calibri" panose="020F0502020204030204" pitchFamily="34" charset="0"/>
+                <a:cs typeface="Calibri" panose="020F0502020204030204" pitchFamily="34" charset="0"/>
+              </a:rPr>
+              <a:t>INQUIRIES</a:t>
+            </a:r>
+          </a:p>
+        </p:txBody>
+      </p:sp>
+      <p:grpSp>
+        <p:nvGrpSpPr>
+          <p:cNvPr id="34" name="Group 33">
+            <a:extLst>
+              <a:ext uri="{FF2B5EF4-FFF2-40B4-BE49-F238E27FC236}">
+                <a16:creationId xmlns:a16="http://schemas.microsoft.com/office/drawing/2014/main" id="{BA7858A6-AE28-F15C-6A9C-1DC8ABBCB405}"/>
+              </a:ext>
+            </a:extLst>
+          </p:cNvPr>
+          <p:cNvGrpSpPr/>
           <p:nvPr/>
-        </p:nvSpPr>
-        <p:spPr>
+        </p:nvGrpSpPr>
+        <p:grpSpPr>
           <a:xfrm>
-            <a:off x="3647768" y="727587"/>
-            <a:ext cx="2782529" cy="1691148"/>
+            <a:off x="363790" y="671051"/>
+            <a:ext cx="11503741" cy="540774"/>
+            <a:chOff x="196645" y="373626"/>
+            <a:chExt cx="11503741" cy="540774"/>
           </a:xfrm>
-          <a:prstGeom prst="roundRect">
-            <a:avLst/>
-          </a:prstGeom>
-          <a:noFill/>
-          <a:ln>
+        </p:grpSpPr>
+        <p:sp>
+          <p:nvSpPr>
+            <p:cNvPr id="20" name="Rectangle: Rounded Corners 19">
+              <a:extLst>
+                <a:ext uri="{FF2B5EF4-FFF2-40B4-BE49-F238E27FC236}">
+                  <a16:creationId xmlns:a16="http://schemas.microsoft.com/office/drawing/2014/main" id="{13ACADDA-4AF8-4680-EBC5-92E7C662BA10}"/>
+                </a:ext>
+              </a:extLst>
+            </p:cNvPr>
+            <p:cNvSpPr/>
+            <p:nvPr/>
+          </p:nvSpPr>
+          <p:spPr>
+            <a:xfrm>
+              <a:off x="196645" y="373626"/>
+              <a:ext cx="11503741" cy="540774"/>
+            </a:xfrm>
+            <a:prstGeom prst="roundRect">
+              <a:avLst/>
+            </a:prstGeom>
+            <a:solidFill>
+              <a:srgbClr val="FF0000"/>
+            </a:solidFill>
+            <a:ln>
+              <a:solidFill>
+                <a:srgbClr val="FF0000"/>
+              </a:solidFill>
+            </a:ln>
+          </p:spPr>
+          <p:style>
+            <a:lnRef idx="2">
+              <a:schemeClr val="accent1">
+                <a:shade val="15000"/>
+              </a:schemeClr>
+            </a:lnRef>
+            <a:fillRef idx="1">
+              <a:schemeClr val="accent1"/>
+            </a:fillRef>
+            <a:effectRef idx="0">
+              <a:schemeClr val="accent1"/>
+            </a:effectRef>
+            <a:fontRef idx="minor">
+              <a:schemeClr val="lt1"/>
+            </a:fontRef>
+          </p:style>
+          <p:txBody>
+            <a:bodyPr rtlCol="0" anchor="ctr"/>
+            <a:lstStyle/>
+            <a:p>
+              <a:endParaRPr lang="en-IN" b="1" dirty="0"/>
+            </a:p>
+          </p:txBody>
+        </p:sp>
+        <p:sp>
+          <p:nvSpPr>
+            <p:cNvPr id="21" name="Rectangle: Rounded Corners 20">
+              <a:extLst>
+                <a:ext uri="{FF2B5EF4-FFF2-40B4-BE49-F238E27FC236}">
+                  <a16:creationId xmlns:a16="http://schemas.microsoft.com/office/drawing/2014/main" id="{48D0A141-6FFF-C79F-A8AB-2A4F67F24DCF}"/>
+                </a:ext>
+              </a:extLst>
+            </p:cNvPr>
+            <p:cNvSpPr/>
+            <p:nvPr/>
+          </p:nvSpPr>
+          <p:spPr>
+            <a:xfrm>
+              <a:off x="10235377" y="484240"/>
+              <a:ext cx="1253614" cy="349044"/>
+            </a:xfrm>
+            <a:prstGeom prst="roundRect">
+              <a:avLst/>
+            </a:prstGeom>
+            <a:solidFill>
+              <a:srgbClr val="C00000"/>
+            </a:solidFill>
+            <a:ln>
+              <a:solidFill>
+                <a:srgbClr val="C00000"/>
+              </a:solidFill>
+            </a:ln>
+          </p:spPr>
+          <p:style>
+            <a:lnRef idx="2">
+              <a:schemeClr val="accent1">
+                <a:shade val="15000"/>
+              </a:schemeClr>
+            </a:lnRef>
+            <a:fillRef idx="1">
+              <a:schemeClr val="accent1"/>
+            </a:fillRef>
+            <a:effectRef idx="0">
+              <a:schemeClr val="accent1"/>
+            </a:effectRef>
+            <a:fontRef idx="minor">
+              <a:schemeClr val="lt1"/>
+            </a:fontRef>
+          </p:style>
+          <p:txBody>
+            <a:bodyPr rtlCol="0" anchor="ctr"/>
+            <a:lstStyle/>
+            <a:p>
+              <a:pPr algn="ctr"/>
+              <a:r>
+                <a:rPr lang="en-IN" sz="1600" b="1" dirty="0">
+                  <a:solidFill>
+                    <a:schemeClr val="bg1"/>
+                  </a:solidFill>
+                  <a:latin typeface="Calibri" panose="020F0502020204030204" pitchFamily="34" charset="0"/>
+                  <a:ea typeface="Calibri" panose="020F0502020204030204" pitchFamily="34" charset="0"/>
+                  <a:cs typeface="Calibri" panose="020F0502020204030204" pitchFamily="34" charset="0"/>
+                </a:rPr>
+                <a:t>Login</a:t>
+              </a:r>
+              <a:r>
+                <a:rPr lang="en-IN" b="1" dirty="0">
+                  <a:solidFill>
+                    <a:schemeClr val="bg1"/>
+                  </a:solidFill>
+                  <a:latin typeface="Calibri" panose="020F0502020204030204" pitchFamily="34" charset="0"/>
+                  <a:ea typeface="Calibri" panose="020F0502020204030204" pitchFamily="34" charset="0"/>
+                  <a:cs typeface="Calibri" panose="020F0502020204030204" pitchFamily="34" charset="0"/>
+                </a:rPr>
+                <a:t> id</a:t>
+              </a:r>
+            </a:p>
+          </p:txBody>
+        </p:sp>
+        <p:sp>
+          <p:nvSpPr>
+            <p:cNvPr id="22" name="Rectangle: Rounded Corners 21">
+              <a:extLst>
+                <a:ext uri="{FF2B5EF4-FFF2-40B4-BE49-F238E27FC236}">
+                  <a16:creationId xmlns:a16="http://schemas.microsoft.com/office/drawing/2014/main" id="{15183DD7-1EB4-8D5D-68B5-BD17462C63EE}"/>
+                </a:ext>
+              </a:extLst>
+            </p:cNvPr>
+            <p:cNvSpPr/>
+            <p:nvPr/>
+          </p:nvSpPr>
+          <p:spPr>
+            <a:xfrm>
+              <a:off x="292512" y="484240"/>
+              <a:ext cx="1705907" cy="349044"/>
+            </a:xfrm>
+            <a:prstGeom prst="roundRect">
+              <a:avLst/>
+            </a:prstGeom>
+            <a:solidFill>
+              <a:srgbClr val="C00000"/>
+            </a:solidFill>
+            <a:ln>
+              <a:solidFill>
+                <a:srgbClr val="C00000"/>
+              </a:solidFill>
+            </a:ln>
+          </p:spPr>
+          <p:style>
+            <a:lnRef idx="2">
+              <a:schemeClr val="accent1">
+                <a:shade val="15000"/>
+              </a:schemeClr>
+            </a:lnRef>
+            <a:fillRef idx="1">
+              <a:schemeClr val="accent1"/>
+            </a:fillRef>
+            <a:effectRef idx="0">
+              <a:schemeClr val="accent1"/>
+            </a:effectRef>
+            <a:fontRef idx="minor">
+              <a:schemeClr val="lt1"/>
+            </a:fontRef>
+          </p:style>
+          <p:txBody>
+            <a:bodyPr rtlCol="0" anchor="ctr"/>
+            <a:lstStyle/>
+            <a:p>
+              <a:pPr algn="ctr"/>
+              <a:r>
+                <a:rPr lang="en-IN" sz="1600" b="1" dirty="0">
+                  <a:solidFill>
+                    <a:schemeClr val="bg1"/>
+                  </a:solidFill>
+                  <a:latin typeface="Calibri" panose="020F0502020204030204" pitchFamily="34" charset="0"/>
+                  <a:ea typeface="Calibri" panose="020F0502020204030204" pitchFamily="34" charset="0"/>
+                  <a:cs typeface="Calibri" panose="020F0502020204030204" pitchFamily="34" charset="0"/>
+                </a:rPr>
+                <a:t>ADMIN PANEL</a:t>
+              </a:r>
+            </a:p>
+          </p:txBody>
+        </p:sp>
+      </p:grpSp>
+      <p:grpSp>
+        <p:nvGrpSpPr>
+          <p:cNvPr id="28" name="Group 27">
+            <a:extLst>
+              <a:ext uri="{FF2B5EF4-FFF2-40B4-BE49-F238E27FC236}">
+                <a16:creationId xmlns:a16="http://schemas.microsoft.com/office/drawing/2014/main" id="{091DCB8A-6971-5A3B-2FBE-49EEE786EAE6}"/>
+              </a:ext>
+            </a:extLst>
+          </p:cNvPr>
+          <p:cNvGrpSpPr/>
+          <p:nvPr/>
+        </p:nvGrpSpPr>
+        <p:grpSpPr>
+          <a:xfrm>
+            <a:off x="4278258" y="2386781"/>
+            <a:ext cx="3264309" cy="1956619"/>
+            <a:chOff x="3751004" y="4527755"/>
+            <a:chExt cx="3264309" cy="1956619"/>
+          </a:xfrm>
+        </p:grpSpPr>
+        <p:sp>
+          <p:nvSpPr>
+            <p:cNvPr id="24" name="Rectangle: Rounded Corners 23">
+              <a:extLst>
+                <a:ext uri="{FF2B5EF4-FFF2-40B4-BE49-F238E27FC236}">
+                  <a16:creationId xmlns:a16="http://schemas.microsoft.com/office/drawing/2014/main" id="{B5345EC5-387E-2AE8-8EE1-2146E5186954}"/>
+                </a:ext>
+              </a:extLst>
+            </p:cNvPr>
+            <p:cNvSpPr/>
+            <p:nvPr/>
+          </p:nvSpPr>
+          <p:spPr>
+            <a:xfrm>
+              <a:off x="3751004" y="4527755"/>
+              <a:ext cx="3264309" cy="1956619"/>
+            </a:xfrm>
+            <a:prstGeom prst="roundRect">
+              <a:avLst/>
+            </a:prstGeom>
             <a:solidFill>
               <a:schemeClr val="bg1">
-                <a:lumMod val="85000"/>
+                <a:lumMod val="95000"/>
               </a:schemeClr>
             </a:solidFill>
-          </a:ln>
-        </p:spPr>
-        <p:style>
-          <a:lnRef idx="2">
-            <a:schemeClr val="accent1">
-              <a:shade val="15000"/>
-            </a:schemeClr>
-          </a:lnRef>
-          <a:fillRef idx="1">
-            <a:schemeClr val="accent1"/>
-          </a:fillRef>
-          <a:effectRef idx="0">
-            <a:schemeClr val="accent1"/>
-          </a:effectRef>
-          <a:fontRef idx="minor">
-            <a:schemeClr val="lt1"/>
-          </a:fontRef>
-        </p:style>
-        <p:txBody>
-          <a:bodyPr rtlCol="0" anchor="ctr"/>
-          <a:lstStyle/>
-          <a:p>
-            <a:pPr algn="ctr"/>
-            <a:endParaRPr lang="en-IN"/>
-          </a:p>
-        </p:txBody>
-      </p:sp>
-      <p:sp>
-        <p:nvSpPr>
-          <p:cNvPr id="4" name="Rectangle: Rounded Corners 3">
-            <a:extLst>
-              <a:ext uri="{FF2B5EF4-FFF2-40B4-BE49-F238E27FC236}">
-                <a16:creationId xmlns:a16="http://schemas.microsoft.com/office/drawing/2014/main" id="{B732FF5E-3AEC-07AE-62BF-623317582DBD}"/>
-              </a:ext>
-            </a:extLst>
-          </p:cNvPr>
-          <p:cNvSpPr/>
+            <a:ln>
+              <a:solidFill>
+                <a:schemeClr val="bg1">
+                  <a:lumMod val="85000"/>
+                </a:schemeClr>
+              </a:solidFill>
+            </a:ln>
+          </p:spPr>
+          <p:style>
+            <a:lnRef idx="2">
+              <a:schemeClr val="accent1">
+                <a:shade val="15000"/>
+              </a:schemeClr>
+            </a:lnRef>
+            <a:fillRef idx="1">
+              <a:schemeClr val="accent1"/>
+            </a:fillRef>
+            <a:effectRef idx="0">
+              <a:schemeClr val="accent1"/>
+            </a:effectRef>
+            <a:fontRef idx="minor">
+              <a:schemeClr val="lt1"/>
+            </a:fontRef>
+          </p:style>
+          <p:txBody>
+            <a:bodyPr rtlCol="0" anchor="ctr"/>
+            <a:lstStyle/>
+            <a:p>
+              <a:pPr algn="ctr"/>
+              <a:endParaRPr lang="en-IN" dirty="0">
+                <a:solidFill>
+                  <a:schemeClr val="tx1"/>
+                </a:solidFill>
+              </a:endParaRPr>
+            </a:p>
+          </p:txBody>
+        </p:sp>
+        <p:sp>
+          <p:nvSpPr>
+            <p:cNvPr id="25" name="Rectangle: Rounded Corners 24">
+              <a:extLst>
+                <a:ext uri="{FF2B5EF4-FFF2-40B4-BE49-F238E27FC236}">
+                  <a16:creationId xmlns:a16="http://schemas.microsoft.com/office/drawing/2014/main" id="{9FA524B0-4E7B-F424-FD73-FC912D9BBE49}"/>
+                </a:ext>
+              </a:extLst>
+            </p:cNvPr>
+            <p:cNvSpPr/>
+            <p:nvPr/>
+          </p:nvSpPr>
+          <p:spPr>
+            <a:xfrm>
+              <a:off x="4085299" y="5569974"/>
+              <a:ext cx="1253614" cy="349044"/>
+            </a:xfrm>
+            <a:prstGeom prst="roundRect">
+              <a:avLst/>
+            </a:prstGeom>
+            <a:solidFill>
+              <a:srgbClr val="00D7B9"/>
+            </a:solidFill>
+            <a:ln>
+              <a:solidFill>
+                <a:srgbClr val="00D7B9"/>
+              </a:solidFill>
+            </a:ln>
+          </p:spPr>
+          <p:style>
+            <a:lnRef idx="2">
+              <a:schemeClr val="accent1">
+                <a:shade val="15000"/>
+              </a:schemeClr>
+            </a:lnRef>
+            <a:fillRef idx="1">
+              <a:schemeClr val="accent1"/>
+            </a:fillRef>
+            <a:effectRef idx="0">
+              <a:schemeClr val="accent1"/>
+            </a:effectRef>
+            <a:fontRef idx="minor">
+              <a:schemeClr val="lt1"/>
+            </a:fontRef>
+          </p:style>
+          <p:txBody>
+            <a:bodyPr rtlCol="0" anchor="ctr"/>
+            <a:lstStyle/>
+            <a:p>
+              <a:pPr algn="ctr"/>
+              <a:r>
+                <a:rPr lang="en-IN" dirty="0">
+                  <a:solidFill>
+                    <a:schemeClr val="bg1"/>
+                  </a:solidFill>
+                  <a:latin typeface="Calibri" panose="020F0502020204030204" pitchFamily="34" charset="0"/>
+                  <a:ea typeface="Calibri" panose="020F0502020204030204" pitchFamily="34" charset="0"/>
+                  <a:cs typeface="Calibri" panose="020F0502020204030204" pitchFamily="34" charset="0"/>
+                </a:rPr>
+                <a:t>New Entry</a:t>
+              </a:r>
+            </a:p>
+          </p:txBody>
+        </p:sp>
+        <p:sp>
+          <p:nvSpPr>
+            <p:cNvPr id="26" name="Rectangle: Rounded Corners 25">
+              <a:extLst>
+                <a:ext uri="{FF2B5EF4-FFF2-40B4-BE49-F238E27FC236}">
+                  <a16:creationId xmlns:a16="http://schemas.microsoft.com/office/drawing/2014/main" id="{757AD313-974B-A13B-546B-6E4CC6989D7A}"/>
+                </a:ext>
+              </a:extLst>
+            </p:cNvPr>
+            <p:cNvSpPr/>
+            <p:nvPr/>
+          </p:nvSpPr>
+          <p:spPr>
+            <a:xfrm>
+              <a:off x="5476563" y="5569974"/>
+              <a:ext cx="1253614" cy="349044"/>
+            </a:xfrm>
+            <a:prstGeom prst="roundRect">
+              <a:avLst/>
+            </a:prstGeom>
+            <a:solidFill>
+              <a:srgbClr val="00D7B9"/>
+            </a:solidFill>
+            <a:ln>
+              <a:solidFill>
+                <a:srgbClr val="00D7B9"/>
+              </a:solidFill>
+            </a:ln>
+          </p:spPr>
+          <p:style>
+            <a:lnRef idx="2">
+              <a:schemeClr val="accent1">
+                <a:shade val="15000"/>
+              </a:schemeClr>
+            </a:lnRef>
+            <a:fillRef idx="1">
+              <a:schemeClr val="accent1"/>
+            </a:fillRef>
+            <a:effectRef idx="0">
+              <a:schemeClr val="accent1"/>
+            </a:effectRef>
+            <a:fontRef idx="minor">
+              <a:schemeClr val="lt1"/>
+            </a:fontRef>
+          </p:style>
+          <p:txBody>
+            <a:bodyPr rtlCol="0" anchor="ctr"/>
+            <a:lstStyle/>
+            <a:p>
+              <a:pPr algn="ctr"/>
+              <a:r>
+                <a:rPr lang="en-IN" dirty="0">
+                  <a:solidFill>
+                    <a:schemeClr val="bg1"/>
+                  </a:solidFill>
+                  <a:latin typeface="Calibri" panose="020F0502020204030204" pitchFamily="34" charset="0"/>
+                  <a:ea typeface="Calibri" panose="020F0502020204030204" pitchFamily="34" charset="0"/>
+                  <a:cs typeface="Calibri" panose="020F0502020204030204" pitchFamily="34" charset="0"/>
+                </a:rPr>
+                <a:t>Details</a:t>
+              </a:r>
+            </a:p>
+          </p:txBody>
+        </p:sp>
+        <p:sp>
+          <p:nvSpPr>
+            <p:cNvPr id="27" name="Rectangle: Rounded Corners 26">
+              <a:extLst>
+                <a:ext uri="{FF2B5EF4-FFF2-40B4-BE49-F238E27FC236}">
+                  <a16:creationId xmlns:a16="http://schemas.microsoft.com/office/drawing/2014/main" id="{F4439560-C98C-B6D5-5E07-0A675CBAE8A8}"/>
+                </a:ext>
+              </a:extLst>
+            </p:cNvPr>
+            <p:cNvSpPr/>
+            <p:nvPr/>
+          </p:nvSpPr>
+          <p:spPr>
+            <a:xfrm>
+              <a:off x="4712106" y="4960374"/>
+              <a:ext cx="1253614" cy="349044"/>
+            </a:xfrm>
+            <a:prstGeom prst="roundRect">
+              <a:avLst/>
+            </a:prstGeom>
+            <a:noFill/>
+            <a:ln>
+              <a:solidFill>
+                <a:schemeClr val="bg1">
+                  <a:lumMod val="85000"/>
+                </a:schemeClr>
+              </a:solidFill>
+            </a:ln>
+          </p:spPr>
+          <p:style>
+            <a:lnRef idx="2">
+              <a:schemeClr val="accent1">
+                <a:shade val="15000"/>
+              </a:schemeClr>
+            </a:lnRef>
+            <a:fillRef idx="1">
+              <a:schemeClr val="accent1"/>
+            </a:fillRef>
+            <a:effectRef idx="0">
+              <a:schemeClr val="accent1"/>
+            </a:effectRef>
+            <a:fontRef idx="minor">
+              <a:schemeClr val="lt1"/>
+            </a:fontRef>
+          </p:style>
+          <p:txBody>
+            <a:bodyPr rtlCol="0" anchor="ctr"/>
+            <a:lstStyle/>
+            <a:p>
+              <a:pPr algn="ctr"/>
+              <a:r>
+                <a:rPr lang="en-IN" dirty="0">
+                  <a:solidFill>
+                    <a:schemeClr val="tx1"/>
+                  </a:solidFill>
+                  <a:latin typeface="Calibri" panose="020F0502020204030204" pitchFamily="34" charset="0"/>
+                  <a:ea typeface="Calibri" panose="020F0502020204030204" pitchFamily="34" charset="0"/>
+                  <a:cs typeface="Calibri" panose="020F0502020204030204" pitchFamily="34" charset="0"/>
+                </a:rPr>
+                <a:t>ORDERS</a:t>
+              </a:r>
+            </a:p>
+          </p:txBody>
+        </p:sp>
+      </p:grpSp>
+      <p:grpSp>
+        <p:nvGrpSpPr>
+          <p:cNvPr id="29" name="Group 28">
+            <a:extLst>
+              <a:ext uri="{FF2B5EF4-FFF2-40B4-BE49-F238E27FC236}">
+                <a16:creationId xmlns:a16="http://schemas.microsoft.com/office/drawing/2014/main" id="{5F846B8B-4164-5D52-9606-C39D8BF0A273}"/>
+              </a:ext>
+            </a:extLst>
+          </p:cNvPr>
+          <p:cNvGrpSpPr/>
           <p:nvPr/>
-        </p:nvSpPr>
-        <p:spPr>
+        </p:nvGrpSpPr>
+        <p:grpSpPr>
           <a:xfrm>
-            <a:off x="6735097" y="727587"/>
-            <a:ext cx="2782529" cy="1691148"/>
+            <a:off x="8603222" y="2450690"/>
+            <a:ext cx="3264309" cy="1956619"/>
+            <a:chOff x="3751004" y="4527755"/>
+            <a:chExt cx="3264309" cy="1956619"/>
           </a:xfrm>
-          <a:prstGeom prst="roundRect">
-            <a:avLst/>
-          </a:prstGeom>
-          <a:noFill/>
-          <a:ln>
+        </p:grpSpPr>
+        <p:sp>
+          <p:nvSpPr>
+            <p:cNvPr id="30" name="Rectangle: Rounded Corners 29">
+              <a:extLst>
+                <a:ext uri="{FF2B5EF4-FFF2-40B4-BE49-F238E27FC236}">
+                  <a16:creationId xmlns:a16="http://schemas.microsoft.com/office/drawing/2014/main" id="{CB515C6E-D8DE-EA1F-D742-687E0154E432}"/>
+                </a:ext>
+              </a:extLst>
+            </p:cNvPr>
+            <p:cNvSpPr/>
+            <p:nvPr/>
+          </p:nvSpPr>
+          <p:spPr>
+            <a:xfrm>
+              <a:off x="3751004" y="4527755"/>
+              <a:ext cx="3264309" cy="1956619"/>
+            </a:xfrm>
+            <a:prstGeom prst="roundRect">
+              <a:avLst/>
+            </a:prstGeom>
             <a:solidFill>
               <a:schemeClr val="bg1">
-                <a:lumMod val="85000"/>
+                <a:lumMod val="95000"/>
               </a:schemeClr>
             </a:solidFill>
-          </a:ln>
-        </p:spPr>
-        <p:style>
-          <a:lnRef idx="2">
-            <a:schemeClr val="accent1">
-              <a:shade val="15000"/>
-            </a:schemeClr>
-          </a:lnRef>
-          <a:fillRef idx="1">
-            <a:schemeClr val="accent1"/>
-          </a:fillRef>
-          <a:effectRef idx="0">
-            <a:schemeClr val="accent1"/>
-          </a:effectRef>
-          <a:fontRef idx="minor">
-            <a:schemeClr val="lt1"/>
-          </a:fontRef>
-        </p:style>
-        <p:txBody>
-          <a:bodyPr rtlCol="0" anchor="ctr"/>
-          <a:lstStyle/>
-          <a:p>
-            <a:pPr algn="ctr"/>
-            <a:endParaRPr lang="en-IN"/>
-          </a:p>
-        </p:txBody>
-      </p:sp>
+            <a:ln>
+              <a:solidFill>
+                <a:schemeClr val="bg1">
+                  <a:lumMod val="85000"/>
+                </a:schemeClr>
+              </a:solidFill>
+            </a:ln>
+          </p:spPr>
+          <p:style>
+            <a:lnRef idx="2">
+              <a:schemeClr val="accent1">
+                <a:shade val="15000"/>
+              </a:schemeClr>
+            </a:lnRef>
+            <a:fillRef idx="1">
+              <a:schemeClr val="accent1"/>
+            </a:fillRef>
+            <a:effectRef idx="0">
+              <a:schemeClr val="accent1"/>
+            </a:effectRef>
+            <a:fontRef idx="minor">
+              <a:schemeClr val="lt1"/>
+            </a:fontRef>
+          </p:style>
+          <p:txBody>
+            <a:bodyPr rtlCol="0" anchor="ctr"/>
+            <a:lstStyle/>
+            <a:p>
+              <a:pPr algn="ctr"/>
+              <a:endParaRPr lang="en-IN" dirty="0">
+                <a:solidFill>
+                  <a:schemeClr val="tx1"/>
+                </a:solidFill>
+              </a:endParaRPr>
+            </a:p>
+          </p:txBody>
+        </p:sp>
+        <p:sp>
+          <p:nvSpPr>
+            <p:cNvPr id="31" name="Rectangle: Rounded Corners 30">
+              <a:extLst>
+                <a:ext uri="{FF2B5EF4-FFF2-40B4-BE49-F238E27FC236}">
+                  <a16:creationId xmlns:a16="http://schemas.microsoft.com/office/drawing/2014/main" id="{627093AC-5D78-DADA-CD2F-4939777C2BAA}"/>
+                </a:ext>
+              </a:extLst>
+            </p:cNvPr>
+            <p:cNvSpPr/>
+            <p:nvPr/>
+          </p:nvSpPr>
+          <p:spPr>
+            <a:xfrm>
+              <a:off x="4085299" y="5569974"/>
+              <a:ext cx="1253614" cy="349044"/>
+            </a:xfrm>
+            <a:prstGeom prst="roundRect">
+              <a:avLst/>
+            </a:prstGeom>
+            <a:solidFill>
+              <a:srgbClr val="00D7B9"/>
+            </a:solidFill>
+            <a:ln>
+              <a:solidFill>
+                <a:srgbClr val="00D7B9"/>
+              </a:solidFill>
+            </a:ln>
+          </p:spPr>
+          <p:style>
+            <a:lnRef idx="2">
+              <a:schemeClr val="accent1">
+                <a:shade val="15000"/>
+              </a:schemeClr>
+            </a:lnRef>
+            <a:fillRef idx="1">
+              <a:schemeClr val="accent1"/>
+            </a:fillRef>
+            <a:effectRef idx="0">
+              <a:schemeClr val="accent1"/>
+            </a:effectRef>
+            <a:fontRef idx="minor">
+              <a:schemeClr val="lt1"/>
+            </a:fontRef>
+          </p:style>
+          <p:txBody>
+            <a:bodyPr rtlCol="0" anchor="ctr"/>
+            <a:lstStyle/>
+            <a:p>
+              <a:pPr algn="ctr"/>
+              <a:r>
+                <a:rPr lang="en-IN" dirty="0">
+                  <a:solidFill>
+                    <a:schemeClr val="bg1"/>
+                  </a:solidFill>
+                  <a:latin typeface="Calibri" panose="020F0502020204030204" pitchFamily="34" charset="0"/>
+                  <a:ea typeface="Calibri" panose="020F0502020204030204" pitchFamily="34" charset="0"/>
+                  <a:cs typeface="Calibri" panose="020F0502020204030204" pitchFamily="34" charset="0"/>
+                </a:rPr>
+                <a:t>New Entry</a:t>
+              </a:r>
+            </a:p>
+          </p:txBody>
+        </p:sp>
+        <p:sp>
+          <p:nvSpPr>
+            <p:cNvPr id="32" name="Rectangle: Rounded Corners 31">
+              <a:extLst>
+                <a:ext uri="{FF2B5EF4-FFF2-40B4-BE49-F238E27FC236}">
+                  <a16:creationId xmlns:a16="http://schemas.microsoft.com/office/drawing/2014/main" id="{F0944E7D-941E-F187-B95D-DB07AB3BB8E4}"/>
+                </a:ext>
+              </a:extLst>
+            </p:cNvPr>
+            <p:cNvSpPr/>
+            <p:nvPr/>
+          </p:nvSpPr>
+          <p:spPr>
+            <a:xfrm>
+              <a:off x="5476563" y="5569974"/>
+              <a:ext cx="1253614" cy="349044"/>
+            </a:xfrm>
+            <a:prstGeom prst="roundRect">
+              <a:avLst/>
+            </a:prstGeom>
+            <a:solidFill>
+              <a:srgbClr val="00D7B9"/>
+            </a:solidFill>
+            <a:ln>
+              <a:solidFill>
+                <a:srgbClr val="00D7B9"/>
+              </a:solidFill>
+            </a:ln>
+          </p:spPr>
+          <p:style>
+            <a:lnRef idx="2">
+              <a:schemeClr val="accent1">
+                <a:shade val="15000"/>
+              </a:schemeClr>
+            </a:lnRef>
+            <a:fillRef idx="1">
+              <a:schemeClr val="accent1"/>
+            </a:fillRef>
+            <a:effectRef idx="0">
+              <a:schemeClr val="accent1"/>
+            </a:effectRef>
+            <a:fontRef idx="minor">
+              <a:schemeClr val="lt1"/>
+            </a:fontRef>
+          </p:style>
+          <p:txBody>
+            <a:bodyPr rtlCol="0" anchor="ctr"/>
+            <a:lstStyle/>
+            <a:p>
+              <a:pPr algn="ctr"/>
+              <a:r>
+                <a:rPr lang="en-IN" dirty="0">
+                  <a:solidFill>
+                    <a:schemeClr val="bg1"/>
+                  </a:solidFill>
+                  <a:latin typeface="Calibri" panose="020F0502020204030204" pitchFamily="34" charset="0"/>
+                  <a:ea typeface="Calibri" panose="020F0502020204030204" pitchFamily="34" charset="0"/>
+                  <a:cs typeface="Calibri" panose="020F0502020204030204" pitchFamily="34" charset="0"/>
+                </a:rPr>
+                <a:t>DATA</a:t>
+              </a:r>
+            </a:p>
+          </p:txBody>
+        </p:sp>
+        <p:sp>
+          <p:nvSpPr>
+            <p:cNvPr id="33" name="Rectangle: Rounded Corners 32">
+              <a:extLst>
+                <a:ext uri="{FF2B5EF4-FFF2-40B4-BE49-F238E27FC236}">
+                  <a16:creationId xmlns:a16="http://schemas.microsoft.com/office/drawing/2014/main" id="{2A02B820-477C-E918-99B3-B9BCF9109BDF}"/>
+                </a:ext>
+              </a:extLst>
+            </p:cNvPr>
+            <p:cNvSpPr/>
+            <p:nvPr/>
+          </p:nvSpPr>
+          <p:spPr>
+            <a:xfrm>
+              <a:off x="4712106" y="4960374"/>
+              <a:ext cx="1253614" cy="349044"/>
+            </a:xfrm>
+            <a:prstGeom prst="roundRect">
+              <a:avLst/>
+            </a:prstGeom>
+            <a:noFill/>
+            <a:ln>
+              <a:solidFill>
+                <a:schemeClr val="bg1">
+                  <a:lumMod val="85000"/>
+                </a:schemeClr>
+              </a:solidFill>
+            </a:ln>
+          </p:spPr>
+          <p:style>
+            <a:lnRef idx="2">
+              <a:schemeClr val="accent1">
+                <a:shade val="15000"/>
+              </a:schemeClr>
+            </a:lnRef>
+            <a:fillRef idx="1">
+              <a:schemeClr val="accent1"/>
+            </a:fillRef>
+            <a:effectRef idx="0">
+              <a:schemeClr val="accent1"/>
+            </a:effectRef>
+            <a:fontRef idx="minor">
+              <a:schemeClr val="lt1"/>
+            </a:fontRef>
+          </p:style>
+          <p:txBody>
+            <a:bodyPr rtlCol="0" anchor="ctr"/>
+            <a:lstStyle/>
+            <a:p>
+              <a:pPr algn="ctr"/>
+              <a:r>
+                <a:rPr lang="en-IN" dirty="0">
+                  <a:solidFill>
+                    <a:schemeClr val="tx1"/>
+                  </a:solidFill>
+                  <a:latin typeface="Calibri" panose="020F0502020204030204" pitchFamily="34" charset="0"/>
+                  <a:ea typeface="Calibri" panose="020F0502020204030204" pitchFamily="34" charset="0"/>
+                  <a:cs typeface="Calibri" panose="020F0502020204030204" pitchFamily="34" charset="0"/>
+                </a:rPr>
+                <a:t>SUPPLIERS</a:t>
+              </a:r>
+            </a:p>
+          </p:txBody>
+        </p:sp>
+      </p:grpSp>
     </p:spTree>
     <p:extLst>
       <p:ext uri="{BB962C8B-B14F-4D97-AF65-F5344CB8AC3E}">

</xml_diff>

<commit_message>
adding input for inquiries new entry
</commit_message>
<xml_diff>
--- a/design ex..pptx
+++ b/design ex..pptx
@@ -200,7 +200,7 @@
           <a:p>
             <a:fld id="{64B69E7C-F0AA-4D71-B4A9-299C9FEFC470}" type="datetimeFigureOut">
               <a:rPr lang="en-IN" smtClean="0"/>
-              <a:t>15-10-2025</a:t>
+              <a:t>18-10-2025</a:t>
             </a:fld>
             <a:endParaRPr lang="en-IN"/>
           </a:p>
@@ -701,7 +701,7 @@
           <a:p>
             <a:fld id="{C21CC959-5C50-46C4-8019-6673AAF2576F}" type="datetimeFigureOut">
               <a:rPr lang="en-IN" smtClean="0"/>
-              <a:t>15-10-2025</a:t>
+              <a:t>18-10-2025</a:t>
             </a:fld>
             <a:endParaRPr lang="en-IN"/>
           </a:p>
@@ -901,7 +901,7 @@
           <a:p>
             <a:fld id="{C21CC959-5C50-46C4-8019-6673AAF2576F}" type="datetimeFigureOut">
               <a:rPr lang="en-IN" smtClean="0"/>
-              <a:t>15-10-2025</a:t>
+              <a:t>18-10-2025</a:t>
             </a:fld>
             <a:endParaRPr lang="en-IN"/>
           </a:p>
@@ -1111,7 +1111,7 @@
           <a:p>
             <a:fld id="{C21CC959-5C50-46C4-8019-6673AAF2576F}" type="datetimeFigureOut">
               <a:rPr lang="en-IN" smtClean="0"/>
-              <a:t>15-10-2025</a:t>
+              <a:t>18-10-2025</a:t>
             </a:fld>
             <a:endParaRPr lang="en-IN"/>
           </a:p>
@@ -1311,7 +1311,7 @@
           <a:p>
             <a:fld id="{C21CC959-5C50-46C4-8019-6673AAF2576F}" type="datetimeFigureOut">
               <a:rPr lang="en-IN" smtClean="0"/>
-              <a:t>15-10-2025</a:t>
+              <a:t>18-10-2025</a:t>
             </a:fld>
             <a:endParaRPr lang="en-IN"/>
           </a:p>
@@ -1587,7 +1587,7 @@
           <a:p>
             <a:fld id="{C21CC959-5C50-46C4-8019-6673AAF2576F}" type="datetimeFigureOut">
               <a:rPr lang="en-IN" smtClean="0"/>
-              <a:t>15-10-2025</a:t>
+              <a:t>18-10-2025</a:t>
             </a:fld>
             <a:endParaRPr lang="en-IN"/>
           </a:p>
@@ -1855,7 +1855,7 @@
           <a:p>
             <a:fld id="{C21CC959-5C50-46C4-8019-6673AAF2576F}" type="datetimeFigureOut">
               <a:rPr lang="en-IN" smtClean="0"/>
-              <a:t>15-10-2025</a:t>
+              <a:t>18-10-2025</a:t>
             </a:fld>
             <a:endParaRPr lang="en-IN"/>
           </a:p>
@@ -2270,7 +2270,7 @@
           <a:p>
             <a:fld id="{C21CC959-5C50-46C4-8019-6673AAF2576F}" type="datetimeFigureOut">
               <a:rPr lang="en-IN" smtClean="0"/>
-              <a:t>15-10-2025</a:t>
+              <a:t>18-10-2025</a:t>
             </a:fld>
             <a:endParaRPr lang="en-IN"/>
           </a:p>
@@ -2412,7 +2412,7 @@
           <a:p>
             <a:fld id="{C21CC959-5C50-46C4-8019-6673AAF2576F}" type="datetimeFigureOut">
               <a:rPr lang="en-IN" smtClean="0"/>
-              <a:t>15-10-2025</a:t>
+              <a:t>18-10-2025</a:t>
             </a:fld>
             <a:endParaRPr lang="en-IN"/>
           </a:p>
@@ -2525,7 +2525,7 @@
           <a:p>
             <a:fld id="{C21CC959-5C50-46C4-8019-6673AAF2576F}" type="datetimeFigureOut">
               <a:rPr lang="en-IN" smtClean="0"/>
-              <a:t>15-10-2025</a:t>
+              <a:t>18-10-2025</a:t>
             </a:fld>
             <a:endParaRPr lang="en-IN"/>
           </a:p>
@@ -2838,7 +2838,7 @@
           <a:p>
             <a:fld id="{C21CC959-5C50-46C4-8019-6673AAF2576F}" type="datetimeFigureOut">
               <a:rPr lang="en-IN" smtClean="0"/>
-              <a:t>15-10-2025</a:t>
+              <a:t>18-10-2025</a:t>
             </a:fld>
             <a:endParaRPr lang="en-IN"/>
           </a:p>
@@ -3127,7 +3127,7 @@
           <a:p>
             <a:fld id="{C21CC959-5C50-46C4-8019-6673AAF2576F}" type="datetimeFigureOut">
               <a:rPr lang="en-IN" smtClean="0"/>
-              <a:t>15-10-2025</a:t>
+              <a:t>18-10-2025</a:t>
             </a:fld>
             <a:endParaRPr lang="en-IN"/>
           </a:p>
@@ -3370,7 +3370,7 @@
           <a:p>
             <a:fld id="{C21CC959-5C50-46C4-8019-6673AAF2576F}" type="datetimeFigureOut">
               <a:rPr lang="en-IN" smtClean="0"/>
-              <a:t>15-10-2025</a:t>
+              <a:t>18-10-2025</a:t>
             </a:fld>
             <a:endParaRPr lang="en-IN"/>
           </a:p>
@@ -5651,6 +5651,266 @@
           <a:chExt cx="0" cy="0"/>
         </a:xfrm>
       </p:grpSpPr>
+      <p:sp>
+        <p:nvSpPr>
+          <p:cNvPr id="2" name="Rectangle: Rounded Corners 1">
+            <a:extLst>
+              <a:ext uri="{FF2B5EF4-FFF2-40B4-BE49-F238E27FC236}">
+                <a16:creationId xmlns:a16="http://schemas.microsoft.com/office/drawing/2014/main" id="{48C42058-7FCE-4A7F-7607-824DDEA6338F}"/>
+              </a:ext>
+            </a:extLst>
+          </p:cNvPr>
+          <p:cNvSpPr/>
+          <p:nvPr/>
+        </p:nvSpPr>
+        <p:spPr>
+          <a:xfrm>
+            <a:off x="491613" y="1356852"/>
+            <a:ext cx="1111044" cy="383458"/>
+          </a:xfrm>
+          <a:prstGeom prst="roundRect">
+            <a:avLst>
+              <a:gd name="adj" fmla="val 37180"/>
+            </a:avLst>
+          </a:prstGeom>
+          <a:solidFill>
+            <a:schemeClr val="bg1"/>
+          </a:solidFill>
+          <a:ln>
+            <a:solidFill>
+              <a:schemeClr val="bg1">
+                <a:lumMod val="85000"/>
+              </a:schemeClr>
+            </a:solidFill>
+          </a:ln>
+        </p:spPr>
+        <p:style>
+          <a:lnRef idx="2">
+            <a:schemeClr val="accent1">
+              <a:shade val="15000"/>
+            </a:schemeClr>
+          </a:lnRef>
+          <a:fillRef idx="1">
+            <a:schemeClr val="accent1"/>
+          </a:fillRef>
+          <a:effectRef idx="0">
+            <a:schemeClr val="accent1"/>
+          </a:effectRef>
+          <a:fontRef idx="minor">
+            <a:schemeClr val="lt1"/>
+          </a:fontRef>
+        </p:style>
+        <p:txBody>
+          <a:bodyPr rtlCol="0" anchor="ctr"/>
+          <a:lstStyle/>
+          <a:p>
+            <a:pPr algn="ctr"/>
+            <a:r>
+              <a:rPr lang="en-IN" dirty="0">
+                <a:solidFill>
+                  <a:schemeClr val="tx1"/>
+                </a:solidFill>
+              </a:rPr>
+              <a:t>S.NO#</a:t>
+            </a:r>
+          </a:p>
+        </p:txBody>
+      </p:sp>
+      <p:sp>
+        <p:nvSpPr>
+          <p:cNvPr id="3" name="Rectangle: Rounded Corners 2">
+            <a:extLst>
+              <a:ext uri="{FF2B5EF4-FFF2-40B4-BE49-F238E27FC236}">
+                <a16:creationId xmlns:a16="http://schemas.microsoft.com/office/drawing/2014/main" id="{BCEB5F37-19E7-0931-6A41-94F00E54BBDE}"/>
+              </a:ext>
+            </a:extLst>
+          </p:cNvPr>
+          <p:cNvSpPr/>
+          <p:nvPr/>
+        </p:nvSpPr>
+        <p:spPr>
+          <a:xfrm>
+            <a:off x="1853381" y="1356852"/>
+            <a:ext cx="1519084" cy="383458"/>
+          </a:xfrm>
+          <a:prstGeom prst="roundRect">
+            <a:avLst>
+              <a:gd name="adj" fmla="val 37180"/>
+            </a:avLst>
+          </a:prstGeom>
+          <a:solidFill>
+            <a:schemeClr val="bg1"/>
+          </a:solidFill>
+          <a:ln>
+            <a:solidFill>
+              <a:schemeClr val="bg1">
+                <a:lumMod val="85000"/>
+              </a:schemeClr>
+            </a:solidFill>
+          </a:ln>
+        </p:spPr>
+        <p:style>
+          <a:lnRef idx="2">
+            <a:schemeClr val="accent1">
+              <a:shade val="15000"/>
+            </a:schemeClr>
+          </a:lnRef>
+          <a:fillRef idx="1">
+            <a:schemeClr val="accent1"/>
+          </a:fillRef>
+          <a:effectRef idx="0">
+            <a:schemeClr val="accent1"/>
+          </a:effectRef>
+          <a:fontRef idx="minor">
+            <a:schemeClr val="lt1"/>
+          </a:fontRef>
+        </p:style>
+        <p:txBody>
+          <a:bodyPr rtlCol="0" anchor="ctr"/>
+          <a:lstStyle/>
+          <a:p>
+            <a:pPr algn="ctr"/>
+            <a:r>
+              <a:rPr lang="en-IN" dirty="0">
+                <a:solidFill>
+                  <a:schemeClr val="tx1"/>
+                </a:solidFill>
+              </a:rPr>
+              <a:t>IMAGE</a:t>
+            </a:r>
+          </a:p>
+        </p:txBody>
+      </p:sp>
+      <p:sp>
+        <p:nvSpPr>
+          <p:cNvPr id="4" name="Rectangle: Rounded Corners 3">
+            <a:extLst>
+              <a:ext uri="{FF2B5EF4-FFF2-40B4-BE49-F238E27FC236}">
+                <a16:creationId xmlns:a16="http://schemas.microsoft.com/office/drawing/2014/main" id="{96CFCDB8-E07E-9F64-6D67-EB28C246D5DA}"/>
+              </a:ext>
+            </a:extLst>
+          </p:cNvPr>
+          <p:cNvSpPr/>
+          <p:nvPr/>
+        </p:nvSpPr>
+        <p:spPr>
+          <a:xfrm>
+            <a:off x="3623188" y="1356852"/>
+            <a:ext cx="2000863" cy="383458"/>
+          </a:xfrm>
+          <a:prstGeom prst="roundRect">
+            <a:avLst>
+              <a:gd name="adj" fmla="val 37180"/>
+            </a:avLst>
+          </a:prstGeom>
+          <a:solidFill>
+            <a:schemeClr val="bg1"/>
+          </a:solidFill>
+          <a:ln>
+            <a:solidFill>
+              <a:schemeClr val="bg1">
+                <a:lumMod val="85000"/>
+              </a:schemeClr>
+            </a:solidFill>
+          </a:ln>
+        </p:spPr>
+        <p:style>
+          <a:lnRef idx="2">
+            <a:schemeClr val="accent1">
+              <a:shade val="15000"/>
+            </a:schemeClr>
+          </a:lnRef>
+          <a:fillRef idx="1">
+            <a:schemeClr val="accent1"/>
+          </a:fillRef>
+          <a:effectRef idx="0">
+            <a:schemeClr val="accent1"/>
+          </a:effectRef>
+          <a:fontRef idx="minor">
+            <a:schemeClr val="lt1"/>
+          </a:fontRef>
+        </p:style>
+        <p:txBody>
+          <a:bodyPr rtlCol="0" anchor="ctr"/>
+          <a:lstStyle/>
+          <a:p>
+            <a:pPr algn="ctr"/>
+            <a:r>
+              <a:rPr lang="en-IN" dirty="0">
+                <a:solidFill>
+                  <a:schemeClr val="tx1"/>
+                </a:solidFill>
+              </a:rPr>
+              <a:t>STYLE/MODLE#</a:t>
+            </a:r>
+          </a:p>
+        </p:txBody>
+      </p:sp>
+      <p:sp>
+        <p:nvSpPr>
+          <p:cNvPr id="5" name="Rectangle: Rounded Corners 4">
+            <a:extLst>
+              <a:ext uri="{FF2B5EF4-FFF2-40B4-BE49-F238E27FC236}">
+                <a16:creationId xmlns:a16="http://schemas.microsoft.com/office/drawing/2014/main" id="{7A37D1D2-3749-AAEF-EE32-85BBF33A31F7}"/>
+              </a:ext>
+            </a:extLst>
+          </p:cNvPr>
+          <p:cNvSpPr/>
+          <p:nvPr/>
+        </p:nvSpPr>
+        <p:spPr>
+          <a:xfrm>
+            <a:off x="5874774" y="1356852"/>
+            <a:ext cx="2000863" cy="383458"/>
+          </a:xfrm>
+          <a:prstGeom prst="roundRect">
+            <a:avLst>
+              <a:gd name="adj" fmla="val 37180"/>
+            </a:avLst>
+          </a:prstGeom>
+          <a:solidFill>
+            <a:schemeClr val="bg1"/>
+          </a:solidFill>
+          <a:ln>
+            <a:solidFill>
+              <a:schemeClr val="bg1">
+                <a:lumMod val="85000"/>
+              </a:schemeClr>
+            </a:solidFill>
+          </a:ln>
+        </p:spPr>
+        <p:style>
+          <a:lnRef idx="2">
+            <a:schemeClr val="accent1">
+              <a:shade val="15000"/>
+            </a:schemeClr>
+          </a:lnRef>
+          <a:fillRef idx="1">
+            <a:schemeClr val="accent1"/>
+          </a:fillRef>
+          <a:effectRef idx="0">
+            <a:schemeClr val="accent1"/>
+          </a:effectRef>
+          <a:fontRef idx="minor">
+            <a:schemeClr val="lt1"/>
+          </a:fontRef>
+        </p:style>
+        <p:txBody>
+          <a:bodyPr rtlCol="0" anchor="ctr"/>
+          <a:lstStyle/>
+          <a:p>
+            <a:pPr algn="ctr"/>
+            <a:r>
+              <a:rPr lang="en-IN" dirty="0">
+                <a:solidFill>
+                  <a:schemeClr val="tx1"/>
+                </a:solidFill>
+              </a:rPr>
+              <a:t>STYLE/MODLE#</a:t>
+            </a:r>
+          </a:p>
+        </p:txBody>
+      </p:sp>
     </p:spTree>
     <p:extLst>
       <p:ext uri="{BB962C8B-B14F-4D97-AF65-F5344CB8AC3E}">

</xml_diff>

<commit_message>
script and css changes
</commit_message>
<xml_diff>
--- a/design ex..pptx
+++ b/design ex..pptx
@@ -5,13 +5,14 @@
     <p:sldMasterId id="2147483648" r:id="rId1"/>
   </p:sldMasterIdLst>
   <p:notesMasterIdLst>
-    <p:notesMasterId r:id="rId6"/>
+    <p:notesMasterId r:id="rId7"/>
   </p:notesMasterIdLst>
   <p:sldIdLst>
     <p:sldId id="256" r:id="rId2"/>
     <p:sldId id="257" r:id="rId3"/>
     <p:sldId id="258" r:id="rId4"/>
     <p:sldId id="259" r:id="rId5"/>
+    <p:sldId id="260" r:id="rId6"/>
   </p:sldIdLst>
   <p:sldSz cx="12192000" cy="6858000"/>
   <p:notesSz cx="6858000" cy="9144000"/>
@@ -200,7 +201,7 @@
           <a:p>
             <a:fld id="{64B69E7C-F0AA-4D71-B4A9-299C9FEFC470}" type="datetimeFigureOut">
               <a:rPr lang="en-IN" smtClean="0"/>
-              <a:t>27-10-2025</a:t>
+              <a:t>28-10-2025</a:t>
             </a:fld>
             <a:endParaRPr lang="en-IN"/>
           </a:p>
@@ -701,7 +702,7 @@
           <a:p>
             <a:fld id="{C21CC959-5C50-46C4-8019-6673AAF2576F}" type="datetimeFigureOut">
               <a:rPr lang="en-IN" smtClean="0"/>
-              <a:t>27-10-2025</a:t>
+              <a:t>28-10-2025</a:t>
             </a:fld>
             <a:endParaRPr lang="en-IN"/>
           </a:p>
@@ -901,7 +902,7 @@
           <a:p>
             <a:fld id="{C21CC959-5C50-46C4-8019-6673AAF2576F}" type="datetimeFigureOut">
               <a:rPr lang="en-IN" smtClean="0"/>
-              <a:t>27-10-2025</a:t>
+              <a:t>28-10-2025</a:t>
             </a:fld>
             <a:endParaRPr lang="en-IN"/>
           </a:p>
@@ -1111,7 +1112,7 @@
           <a:p>
             <a:fld id="{C21CC959-5C50-46C4-8019-6673AAF2576F}" type="datetimeFigureOut">
               <a:rPr lang="en-IN" smtClean="0"/>
-              <a:t>27-10-2025</a:t>
+              <a:t>28-10-2025</a:t>
             </a:fld>
             <a:endParaRPr lang="en-IN"/>
           </a:p>
@@ -1311,7 +1312,7 @@
           <a:p>
             <a:fld id="{C21CC959-5C50-46C4-8019-6673AAF2576F}" type="datetimeFigureOut">
               <a:rPr lang="en-IN" smtClean="0"/>
-              <a:t>27-10-2025</a:t>
+              <a:t>28-10-2025</a:t>
             </a:fld>
             <a:endParaRPr lang="en-IN"/>
           </a:p>
@@ -1587,7 +1588,7 @@
           <a:p>
             <a:fld id="{C21CC959-5C50-46C4-8019-6673AAF2576F}" type="datetimeFigureOut">
               <a:rPr lang="en-IN" smtClean="0"/>
-              <a:t>27-10-2025</a:t>
+              <a:t>28-10-2025</a:t>
             </a:fld>
             <a:endParaRPr lang="en-IN"/>
           </a:p>
@@ -1855,7 +1856,7 @@
           <a:p>
             <a:fld id="{C21CC959-5C50-46C4-8019-6673AAF2576F}" type="datetimeFigureOut">
               <a:rPr lang="en-IN" smtClean="0"/>
-              <a:t>27-10-2025</a:t>
+              <a:t>28-10-2025</a:t>
             </a:fld>
             <a:endParaRPr lang="en-IN"/>
           </a:p>
@@ -2270,7 +2271,7 @@
           <a:p>
             <a:fld id="{C21CC959-5C50-46C4-8019-6673AAF2576F}" type="datetimeFigureOut">
               <a:rPr lang="en-IN" smtClean="0"/>
-              <a:t>27-10-2025</a:t>
+              <a:t>28-10-2025</a:t>
             </a:fld>
             <a:endParaRPr lang="en-IN"/>
           </a:p>
@@ -2412,7 +2413,7 @@
           <a:p>
             <a:fld id="{C21CC959-5C50-46C4-8019-6673AAF2576F}" type="datetimeFigureOut">
               <a:rPr lang="en-IN" smtClean="0"/>
-              <a:t>27-10-2025</a:t>
+              <a:t>28-10-2025</a:t>
             </a:fld>
             <a:endParaRPr lang="en-IN"/>
           </a:p>
@@ -2525,7 +2526,7 @@
           <a:p>
             <a:fld id="{C21CC959-5C50-46C4-8019-6673AAF2576F}" type="datetimeFigureOut">
               <a:rPr lang="en-IN" smtClean="0"/>
-              <a:t>27-10-2025</a:t>
+              <a:t>28-10-2025</a:t>
             </a:fld>
             <a:endParaRPr lang="en-IN"/>
           </a:p>
@@ -2838,7 +2839,7 @@
           <a:p>
             <a:fld id="{C21CC959-5C50-46C4-8019-6673AAF2576F}" type="datetimeFigureOut">
               <a:rPr lang="en-IN" smtClean="0"/>
-              <a:t>27-10-2025</a:t>
+              <a:t>28-10-2025</a:t>
             </a:fld>
             <a:endParaRPr lang="en-IN"/>
           </a:p>
@@ -3127,7 +3128,7 @@
           <a:p>
             <a:fld id="{C21CC959-5C50-46C4-8019-6673AAF2576F}" type="datetimeFigureOut">
               <a:rPr lang="en-IN" smtClean="0"/>
-              <a:t>27-10-2025</a:t>
+              <a:t>28-10-2025</a:t>
             </a:fld>
             <a:endParaRPr lang="en-IN"/>
           </a:p>
@@ -3370,7 +3371,7 @@
           <a:p>
             <a:fld id="{C21CC959-5C50-46C4-8019-6673AAF2576F}" type="datetimeFigureOut">
               <a:rPr lang="en-IN" smtClean="0"/>
-              <a:t>27-10-2025</a:t>
+              <a:t>28-10-2025</a:t>
             </a:fld>
             <a:endParaRPr lang="en-IN"/>
           </a:p>
@@ -5665,8 +5666,8 @@
         </p:nvSpPr>
         <p:spPr>
           <a:xfrm>
-            <a:off x="457937" y="1432806"/>
-            <a:ext cx="2226269" cy="4574704"/>
+            <a:off x="2493891" y="498495"/>
+            <a:ext cx="7204218" cy="731519"/>
           </a:xfrm>
           <a:prstGeom prst="roundRect">
             <a:avLst/>
@@ -5997,7 +5998,7 @@
         </p:nvSpPr>
         <p:spPr>
           <a:xfrm>
-            <a:off x="599768" y="2020527"/>
+            <a:off x="2609052" y="615988"/>
             <a:ext cx="1836541" cy="496531"/>
           </a:xfrm>
           <a:prstGeom prst="roundRect">
@@ -6063,7 +6064,7 @@
         </p:nvSpPr>
         <p:spPr>
           <a:xfrm>
-            <a:off x="2153265" y="2164325"/>
+            <a:off x="4181168" y="759786"/>
             <a:ext cx="205432" cy="208933"/>
           </a:xfrm>
           <a:prstGeom prst="flowChartMerge">
@@ -6109,7 +6110,7 @@
         </p:nvSpPr>
         <p:spPr>
           <a:xfrm>
-            <a:off x="599768" y="3223997"/>
+            <a:off x="5099438" y="611068"/>
             <a:ext cx="1836541" cy="496531"/>
           </a:xfrm>
           <a:prstGeom prst="roundRect">
@@ -6175,7 +6176,7 @@
         </p:nvSpPr>
         <p:spPr>
           <a:xfrm>
-            <a:off x="2153265" y="3367795"/>
+            <a:off x="6640277" y="759786"/>
             <a:ext cx="205432" cy="208933"/>
           </a:xfrm>
           <a:prstGeom prst="flowChartMerge">
@@ -6221,7 +6222,7 @@
         </p:nvSpPr>
         <p:spPr>
           <a:xfrm>
-            <a:off x="599768" y="4465564"/>
+            <a:off x="7433864" y="611068"/>
             <a:ext cx="1836541" cy="496531"/>
           </a:xfrm>
           <a:prstGeom prst="roundRect">
@@ -6287,7 +6288,7 @@
         </p:nvSpPr>
         <p:spPr>
           <a:xfrm>
-            <a:off x="2153265" y="4609362"/>
+            <a:off x="8987361" y="754866"/>
             <a:ext cx="205432" cy="208933"/>
           </a:xfrm>
           <a:prstGeom prst="flowChartMerge">
@@ -6341,44 +6342,8 @@
         </p:blipFill>
         <p:spPr>
           <a:xfrm>
-            <a:off x="3037430" y="2164325"/>
-            <a:ext cx="8260693" cy="2391955"/>
-          </a:xfrm>
-          <a:prstGeom prst="rect">
-            <a:avLst/>
-          </a:prstGeom>
-        </p:spPr>
-      </p:pic>
-      <p:pic>
-        <p:nvPicPr>
-          <p:cNvPr id="16" name="Picture 15" descr="A close up of a logo&#10;&#10;AI-generated content may be incorrect.">
-            <a:extLst>
-              <a:ext uri="{FF2B5EF4-FFF2-40B4-BE49-F238E27FC236}">
-                <a16:creationId xmlns:a16="http://schemas.microsoft.com/office/drawing/2014/main" id="{5D779476-0659-E0F9-DB1C-F1A0650C2C1C}"/>
-              </a:ext>
-            </a:extLst>
-          </p:cNvPr>
-          <p:cNvPicPr>
-            <a:picLocks noChangeAspect="1"/>
-          </p:cNvPicPr>
-          <p:nvPr/>
-        </p:nvPicPr>
-        <p:blipFill>
-          <a:blip r:embed="rId3">
-            <a:extLst>
-              <a:ext uri="{28A0092B-C50C-407E-A947-70E740481C1C}">
-                <a14:useLocalDpi xmlns:a14="http://schemas.microsoft.com/office/drawing/2010/main" val="0"/>
-              </a:ext>
-            </a:extLst>
-          </a:blip>
-          <a:stretch>
-            <a:fillRect/>
-          </a:stretch>
-        </p:blipFill>
-        <p:spPr>
-          <a:xfrm>
-            <a:off x="764347" y="567222"/>
-            <a:ext cx="2893253" cy="415701"/>
+            <a:off x="452284" y="2164325"/>
+            <a:ext cx="11065421" cy="3204088"/>
           </a:xfrm>
           <a:prstGeom prst="rect">
             <a:avLst/>
@@ -6389,6 +6354,36 @@
     <p:extLst>
       <p:ext uri="{BB962C8B-B14F-4D97-AF65-F5344CB8AC3E}">
         <p14:creationId xmlns:p14="http://schemas.microsoft.com/office/powerpoint/2010/main" val="1589142585"/>
+      </p:ext>
+    </p:extLst>
+  </p:cSld>
+  <p:clrMapOvr>
+    <a:masterClrMapping/>
+  </p:clrMapOvr>
+</p:sld>
+</file>
+
+<file path=ppt/slides/slide5.xml><?xml version="1.0" encoding="utf-8"?>
+<p:sld xmlns:a="http://schemas.openxmlformats.org/drawingml/2006/main" xmlns:r="http://schemas.openxmlformats.org/officeDocument/2006/relationships" xmlns:p="http://schemas.openxmlformats.org/presentationml/2006/main">
+  <p:cSld>
+    <p:spTree>
+      <p:nvGrpSpPr>
+        <p:cNvPr id="1" name=""/>
+        <p:cNvGrpSpPr/>
+        <p:nvPr/>
+      </p:nvGrpSpPr>
+      <p:grpSpPr>
+        <a:xfrm>
+          <a:off x="0" y="0"/>
+          <a:ext cx="0" cy="0"/>
+          <a:chOff x="0" y="0"/>
+          <a:chExt cx="0" cy="0"/>
+        </a:xfrm>
+      </p:grpSpPr>
+    </p:spTree>
+    <p:extLst>
+      <p:ext uri="{BB962C8B-B14F-4D97-AF65-F5344CB8AC3E}">
+        <p14:creationId xmlns:p14="http://schemas.microsoft.com/office/powerpoint/2010/main" val="3856632679"/>
       </p:ext>
     </p:extLst>
   </p:cSld>

</xml_diff>